<commit_message>
Fixed one more script item
</commit_message>
<xml_diff>
--- a/Presentation_Materials/Timetable.pptx
+++ b/Presentation_Materials/Timetable.pptx
@@ -511,7 +511,19 @@
             </a:r>
             <a:r>
               <a:rPr lang="en-US" baseline="0" dirty="0" smtClean="0"/>
-              <a:t> lot of our work in this project was focused on data wrangling, storage, and learning the intricacies of our analysis tools, or learning them entirely.  This did not come as a surprise, as those of us in the data analytics program have learned throughout that the data preparation stage takes the majority of the time.  We also ran into unexpected issues and delays.  For mapping, there were sheer size limitations that constrained what we could map, or how large the maps were (in one case, half a gigabyte), or how long they took to load.  In data wrangling, we were able to create files, but had issues saving them in formats that could be easily loaded up again.  There were delays due to unforeseen unsupported features.  For example, Spark cannot perform nested queries – and it took awhile to apply the workaround.  All of these issues and delays contributed to a need to constantly revise our goals an expectations for the project.  </a:t>
+              <a:t> lot of our work in this project was focused on data wrangling, storage, and learning the intricacies of our analysis tools, or learning them entirely.  This did not come as a surprise, as those of us in the data analytics program have learned throughout that the data preparation stage takes the majority of the time.  We also ran into unexpected issues and delays.  For mapping, there were sheer size limitations that constrained what we could map, or how large the maps were (in one case, half a gigabyte), or how long they took to load.  In data wrangling, we were able to create files, but had issues saving them in formats that could be easily loaded up again.  There were delays due to unforeseen unsupported features.  For example, Spark cannot perform nested queries – and it took awhile to apply the workaround.  All of these issues and delays contributed to a need to constantly revise our </a:t>
+            </a:r>
+            <a:r>
+              <a:rPr lang="en-US" baseline="0" smtClean="0"/>
+              <a:t>goals </a:t>
+            </a:r>
+            <a:r>
+              <a:rPr lang="en-US" baseline="0" smtClean="0"/>
+              <a:t>and </a:t>
+            </a:r>
+            <a:r>
+              <a:rPr lang="en-US" baseline="0" dirty="0" smtClean="0"/>
+              <a:t>expectations for the project.  </a:t>
             </a:r>
             <a:r>
               <a:rPr lang="en-US" dirty="0" smtClean="0"/>
@@ -519,15 +531,7 @@
             </a:r>
             <a:r>
               <a:rPr lang="en-US" baseline="0" dirty="0" smtClean="0"/>
-              <a:t> finals.  We will polish our existing analyses and write the paper, but due </a:t>
-            </a:r>
-            <a:r>
-              <a:rPr lang="en-US" baseline="0" smtClean="0"/>
-              <a:t>to competing </a:t>
-            </a:r>
-            <a:r>
-              <a:rPr lang="en-US" baseline="0" dirty="0" smtClean="0"/>
-              <a:t>demands from other courses, we anticipate that will be the majority of our remaining accomplishments.</a:t>
+              <a:t> finals.  We will polish our existing analyses and write the paper, but due to competing demands from other courses, we anticipate that will be the majority of our remaining accomplishments.</a:t>
             </a:r>
             <a:endParaRPr lang="en-US" dirty="0" smtClean="0"/>
           </a:p>

</xml_diff>